<commit_message>
Changed few mistakes in presentation
</commit_message>
<xml_diff>
--- a/Презентация  Project 13.pptx
+++ b/Презентация  Project 13.pptx
@@ -6137,8 +6137,8 @@
               <a:t>Расчёт факториала и </a:t>
             </a:r>
             <a:r>
-              <a:rPr lang="ru-RU" dirty="0" err="1" smtClean="0"/>
-              <a:t>последованности</a:t>
+              <a:rPr lang="ru-RU" smtClean="0"/>
+              <a:t>последованости</a:t>
             </a:r>
             <a:r>
               <a:rPr lang="ru-RU" dirty="0" smtClean="0"/>
@@ -7383,13 +7383,13 @@
   <p:clrMapOvr>
     <a:masterClrMapping/>
   </p:clrMapOvr>
-  <mc:AlternateContent xmlns:mc="http://schemas.openxmlformats.org/markup-compatibility/2006">
-    <mc:Choice xmlns:p14="http://schemas.microsoft.com/office/powerpoint/2010/main" Requires="p14">
+  <mc:AlternateContent xmlns:mc="http://schemas.openxmlformats.org/markup-compatibility/2006" xmlns:p14="http://schemas.microsoft.com/office/powerpoint/2010/main">
+    <mc:Choice Requires="p14">
       <p:transition spd="slow" p14:dur="2000">
         <p14:ferris dir="l"/>
       </p:transition>
     </mc:Choice>
-    <mc:Fallback>
+    <mc:Fallback xmlns="">
       <p:transition spd="slow">
         <p:fade/>
       </p:transition>

</xml_diff>